<commit_message>
Add some experimental results to Presentation.
</commit_message>
<xml_diff>
--- a/dec24.pptx
+++ b/dec24.pptx
@@ -17,7 +17,10 @@
     <p:sldId id="270" r:id="rId11"/>
     <p:sldId id="260" r:id="rId12"/>
     <p:sldId id="271" r:id="rId13"/>
-    <p:sldId id="267" r:id="rId14"/>
+    <p:sldId id="272" r:id="rId14"/>
+    <p:sldId id="273" r:id="rId15"/>
+    <p:sldId id="274" r:id="rId16"/>
+    <p:sldId id="267" r:id="rId17"/>
   </p:sldIdLst>
   <p:sldSz cx="12192000" cy="6858000"/>
   <p:notesSz cx="6858000" cy="9144000"/>
@@ -116,6 +119,11 @@
       </a:defRPr>
     </a:lvl9pPr>
   </p:defaultTextStyle>
+  <p:extLst>
+    <p:ext uri="{EFAFB233-063F-42B5-8137-9DF3F51BA10A}">
+      <p15:sldGuideLst xmlns:p15="http://schemas.microsoft.com/office/powerpoint/2012/main"/>
+    </p:ext>
+  </p:extLst>
 </p:presentation>
 </file>
 
@@ -450,7 +458,7 @@
           <a:p>
             <a:fld id="{D76DAD1F-09EF-474B-A568-460EE7FB614B}" type="datetimeFigureOut">
               <a:rPr lang="en-US" smtClean="0"/>
-              <a:t>12/23/2020</a:t>
+              <a:t>12/24/2020</a:t>
             </a:fld>
             <a:endParaRPr lang="en-US"/>
           </a:p>
@@ -774,7 +782,7 @@
           <a:p>
             <a:fld id="{D76DAD1F-09EF-474B-A568-460EE7FB614B}" type="datetimeFigureOut">
               <a:rPr lang="en-US" smtClean="0"/>
-              <a:t>12/23/2020</a:t>
+              <a:t>12/24/2020</a:t>
             </a:fld>
             <a:endParaRPr lang="en-US"/>
           </a:p>
@@ -1022,7 +1030,7 @@
           <a:p>
             <a:fld id="{D76DAD1F-09EF-474B-A568-460EE7FB614B}" type="datetimeFigureOut">
               <a:rPr lang="en-US" smtClean="0"/>
-              <a:t>12/23/2020</a:t>
+              <a:t>12/24/2020</a:t>
             </a:fld>
             <a:endParaRPr lang="en-US"/>
           </a:p>
@@ -1361,7 +1369,7 @@
           <a:p>
             <a:fld id="{D76DAD1F-09EF-474B-A568-460EE7FB614B}" type="datetimeFigureOut">
               <a:rPr lang="en-US" smtClean="0"/>
-              <a:t>12/23/2020</a:t>
+              <a:t>12/24/2020</a:t>
             </a:fld>
             <a:endParaRPr lang="en-US"/>
           </a:p>
@@ -1708,7 +1716,7 @@
           <a:p>
             <a:fld id="{D76DAD1F-09EF-474B-A568-460EE7FB614B}" type="datetimeFigureOut">
               <a:rPr lang="en-US" smtClean="0"/>
-              <a:t>12/23/2020</a:t>
+              <a:t>12/24/2020</a:t>
             </a:fld>
             <a:endParaRPr lang="en-US"/>
           </a:p>
@@ -2082,7 +2090,7 @@
           <a:p>
             <a:fld id="{D76DAD1F-09EF-474B-A568-460EE7FB614B}" type="datetimeFigureOut">
               <a:rPr lang="en-US" smtClean="0"/>
-              <a:t>12/23/2020</a:t>
+              <a:t>12/24/2020</a:t>
             </a:fld>
             <a:endParaRPr lang="en-US"/>
           </a:p>
@@ -2552,7 +2560,7 @@
           <a:p>
             <a:fld id="{D76DAD1F-09EF-474B-A568-460EE7FB614B}" type="datetimeFigureOut">
               <a:rPr lang="en-US" smtClean="0"/>
-              <a:t>12/23/2020</a:t>
+              <a:t>12/24/2020</a:t>
             </a:fld>
             <a:endParaRPr lang="en-US"/>
           </a:p>
@@ -2757,7 +2765,7 @@
           <a:p>
             <a:fld id="{D76DAD1F-09EF-474B-A568-460EE7FB614B}" type="datetimeFigureOut">
               <a:rPr lang="en-US" smtClean="0"/>
-              <a:t>12/23/2020</a:t>
+              <a:t>12/24/2020</a:t>
             </a:fld>
             <a:endParaRPr lang="en-US"/>
           </a:p>
@@ -2968,7 +2976,7 @@
           <a:p>
             <a:fld id="{D76DAD1F-09EF-474B-A568-460EE7FB614B}" type="datetimeFigureOut">
               <a:rPr lang="en-US" smtClean="0"/>
-              <a:t>12/23/2020</a:t>
+              <a:t>12/24/2020</a:t>
             </a:fld>
             <a:endParaRPr lang="en-US"/>
           </a:p>
@@ -3200,7 +3208,7 @@
           <a:p>
             <a:fld id="{D76DAD1F-09EF-474B-A568-460EE7FB614B}" type="datetimeFigureOut">
               <a:rPr lang="en-US" smtClean="0"/>
-              <a:t>12/23/2020</a:t>
+              <a:t>12/24/2020</a:t>
             </a:fld>
             <a:endParaRPr lang="en-US"/>
           </a:p>
@@ -3448,7 +3456,7 @@
           <a:p>
             <a:fld id="{D76DAD1F-09EF-474B-A568-460EE7FB614B}" type="datetimeFigureOut">
               <a:rPr lang="en-US" smtClean="0"/>
-              <a:t>12/23/2020</a:t>
+              <a:t>12/24/2020</a:t>
             </a:fld>
             <a:endParaRPr lang="en-US"/>
           </a:p>
@@ -3746,7 +3754,7 @@
           <a:p>
             <a:fld id="{D76DAD1F-09EF-474B-A568-460EE7FB614B}" type="datetimeFigureOut">
               <a:rPr lang="en-US" smtClean="0"/>
-              <a:t>12/23/2020</a:t>
+              <a:t>12/24/2020</a:t>
             </a:fld>
             <a:endParaRPr lang="en-US"/>
           </a:p>
@@ -4140,7 +4148,7 @@
           <a:p>
             <a:fld id="{D76DAD1F-09EF-474B-A568-460EE7FB614B}" type="datetimeFigureOut">
               <a:rPr lang="en-US" smtClean="0"/>
-              <a:t>12/23/2020</a:t>
+              <a:t>12/24/2020</a:t>
             </a:fld>
             <a:endParaRPr lang="en-US"/>
           </a:p>
@@ -4289,7 +4297,7 @@
           <a:p>
             <a:fld id="{D76DAD1F-09EF-474B-A568-460EE7FB614B}" type="datetimeFigureOut">
               <a:rPr lang="en-US" smtClean="0"/>
-              <a:t>12/23/2020</a:t>
+              <a:t>12/24/2020</a:t>
             </a:fld>
             <a:endParaRPr lang="en-US"/>
           </a:p>
@@ -4415,7 +4423,7 @@
           <a:p>
             <a:fld id="{D76DAD1F-09EF-474B-A568-460EE7FB614B}" type="datetimeFigureOut">
               <a:rPr lang="en-US" smtClean="0"/>
-              <a:t>12/23/2020</a:t>
+              <a:t>12/24/2020</a:t>
             </a:fld>
             <a:endParaRPr lang="en-US"/>
           </a:p>
@@ -4670,7 +4678,7 @@
           <a:p>
             <a:fld id="{D76DAD1F-09EF-474B-A568-460EE7FB614B}" type="datetimeFigureOut">
               <a:rPr lang="en-US" smtClean="0"/>
-              <a:t>12/23/2020</a:t>
+              <a:t>12/24/2020</a:t>
             </a:fld>
             <a:endParaRPr lang="en-US"/>
           </a:p>
@@ -4985,7 +4993,7 @@
           <a:p>
             <a:fld id="{D76DAD1F-09EF-474B-A568-460EE7FB614B}" type="datetimeFigureOut">
               <a:rPr lang="en-US" smtClean="0"/>
-              <a:t>12/23/2020</a:t>
+              <a:t>12/24/2020</a:t>
             </a:fld>
             <a:endParaRPr lang="en-US"/>
           </a:p>
@@ -5336,7 +5344,7 @@
           <a:p>
             <a:fld id="{D76DAD1F-09EF-474B-A568-460EE7FB614B}" type="datetimeFigureOut">
               <a:rPr lang="en-US" smtClean="0"/>
-              <a:t>12/23/2020</a:t>
+              <a:t>12/24/2020</a:t>
             </a:fld>
             <a:endParaRPr lang="en-US"/>
           </a:p>
@@ -6471,6 +6479,2006 @@
           <p:cNvPr id="2" name="Title 1">
             <a:extLst>
               <a:ext uri="{FF2B5EF4-FFF2-40B4-BE49-F238E27FC236}">
+                <a16:creationId xmlns:a16="http://schemas.microsoft.com/office/drawing/2014/main" id="{08FA0447-EE8A-4FD4-9B2F-50CE44D80D06}"/>
+              </a:ext>
+            </a:extLst>
+          </p:cNvPr>
+          <p:cNvSpPr>
+            <a:spLocks noGrp="1"/>
+          </p:cNvSpPr>
+          <p:nvPr>
+            <p:ph type="title"/>
+          </p:nvPr>
+        </p:nvSpPr>
+        <p:spPr/>
+        <p:txBody>
+          <a:bodyPr/>
+          <a:lstStyle/>
+          <a:p>
+            <a:pPr algn="l"/>
+            <a:r>
+              <a:rPr lang="zh-CN" altLang="en-US" dirty="0"/>
+              <a:t>当前进展</a:t>
+            </a:r>
+            <a:endParaRPr lang="en-US" dirty="0"/>
+          </a:p>
+        </p:txBody>
+      </p:sp>
+      <mc:AlternateContent xmlns:mc="http://schemas.openxmlformats.org/markup-compatibility/2006">
+        <mc:Choice xmlns:a14="http://schemas.microsoft.com/office/drawing/2010/main" Requires="a14">
+          <p:sp>
+            <p:nvSpPr>
+              <p:cNvPr id="4" name="Content Placeholder 3">
+                <a:extLst>
+                  <a:ext uri="{FF2B5EF4-FFF2-40B4-BE49-F238E27FC236}">
+                    <a16:creationId xmlns:a16="http://schemas.microsoft.com/office/drawing/2014/main" id="{41B29A9D-7C58-48D0-A432-C63F041C38DE}"/>
+                  </a:ext>
+                </a:extLst>
+              </p:cNvPr>
+              <p:cNvSpPr>
+                <a:spLocks noGrp="1"/>
+              </p:cNvSpPr>
+              <p:nvPr>
+                <p:ph idx="1"/>
+              </p:nvPr>
+            </p:nvSpPr>
+            <p:spPr/>
+            <p:txBody>
+              <a:bodyPr>
+                <a:normAutofit fontScale="85000" lnSpcReduction="10000"/>
+              </a:bodyPr>
+              <a:lstStyle/>
+              <a:p>
+                <a:r>
+                  <a:rPr lang="zh-CN" altLang="en-US" dirty="0"/>
+                  <a:t>针对</a:t>
+                </a:r>
+                <a:r>
+                  <a:rPr lang="en-US" altLang="zh-CN" dirty="0"/>
+                  <a:t>2D</a:t>
+                </a:r>
+                <a:r>
+                  <a:rPr lang="zh-CN" altLang="en-US" dirty="0"/>
+                  <a:t>模型问题，实现了单级低秩修正预条件子</a:t>
+                </a:r>
+                <a:endParaRPr lang="en-US" altLang="zh-CN" dirty="0"/>
+              </a:p>
+              <a:p>
+                <a:pPr lvl="1"/>
+                <a:r>
+                  <a:rPr lang="zh-CN" altLang="en-US" dirty="0"/>
+                  <a:t>为了验证低秩修正确实能降低迭代步数</a:t>
+                </a:r>
+                <a:endParaRPr lang="en-US" altLang="zh-CN" dirty="0"/>
+              </a:p>
+              <a:p>
+                <a:r>
+                  <a:rPr lang="zh-CN" altLang="en-US" dirty="0"/>
+                  <a:t>块雅各比预条件子</a:t>
+                </a:r>
+                <a:endParaRPr lang="en-US" altLang="zh-CN" dirty="0"/>
+              </a:p>
+              <a:p>
+                <a:pPr lvl="1"/>
+                <a14:m>
+                  <m:oMath xmlns:m="http://schemas.openxmlformats.org/officeDocument/2006/math">
+                    <m:r>
+                      <a:rPr lang="en-US" altLang="zh-CN" b="0" i="1" smtClean="0">
+                        <a:latin typeface="Cambria Math" panose="02040503050406030204" pitchFamily="18" charset="0"/>
+                      </a:rPr>
+                      <m:t>𝐴</m:t>
+                    </m:r>
+                    <m:r>
+                      <a:rPr lang="en-US" altLang="zh-CN" b="0" i="1" smtClean="0">
+                        <a:latin typeface="Cambria Math" panose="02040503050406030204" pitchFamily="18" charset="0"/>
+                      </a:rPr>
+                      <m:t>=</m:t>
+                    </m:r>
+                    <m:d>
+                      <m:dPr>
+                        <m:begChr m:val="["/>
+                        <m:endChr m:val="]"/>
+                        <m:ctrlPr>
+                          <a:rPr lang="en-US" altLang="zh-CN" b="0" i="1" smtClean="0">
+                            <a:latin typeface="Cambria Math" panose="02040503050406030204" pitchFamily="18" charset="0"/>
+                          </a:rPr>
+                        </m:ctrlPr>
+                      </m:dPr>
+                      <m:e>
+                        <m:m>
+                          <m:mPr>
+                            <m:mcs>
+                              <m:mc>
+                                <m:mcPr>
+                                  <m:count m:val="2"/>
+                                  <m:mcJc m:val="center"/>
+                                </m:mcPr>
+                              </m:mc>
+                            </m:mcs>
+                            <m:ctrlPr>
+                              <a:rPr lang="en-US" altLang="zh-CN" b="0" i="1" smtClean="0">
+                                <a:latin typeface="Cambria Math" panose="02040503050406030204" pitchFamily="18" charset="0"/>
+                              </a:rPr>
+                            </m:ctrlPr>
+                          </m:mPr>
+                          <m:mr>
+                            <m:e>
+                              <m:sSub>
+                                <m:sSubPr>
+                                  <m:ctrlPr>
+                                    <a:rPr lang="en-US" altLang="zh-CN" b="0" i="1" smtClean="0">
+                                      <a:latin typeface="Cambria Math" panose="02040503050406030204" pitchFamily="18" charset="0"/>
+                                    </a:rPr>
+                                  </m:ctrlPr>
+                                </m:sSubPr>
+                                <m:e>
+                                  <m:r>
+                                    <a:rPr lang="en-US" altLang="zh-CN" b="0" i="1" smtClean="0">
+                                      <a:latin typeface="Cambria Math" panose="02040503050406030204" pitchFamily="18" charset="0"/>
+                                    </a:rPr>
+                                    <m:t>𝐴</m:t>
+                                  </m:r>
+                                </m:e>
+                                <m:sub>
+                                  <m:r>
+                                    <a:rPr lang="en-US" altLang="zh-CN" b="0" i="1" smtClean="0">
+                                      <a:latin typeface="Cambria Math" panose="02040503050406030204" pitchFamily="18" charset="0"/>
+                                    </a:rPr>
+                                    <m:t>11</m:t>
+                                  </m:r>
+                                </m:sub>
+                              </m:sSub>
+                            </m:e>
+                            <m:e>
+                              <m:sSub>
+                                <m:sSubPr>
+                                  <m:ctrlPr>
+                                    <a:rPr lang="en-US" altLang="zh-CN" i="1">
+                                      <a:latin typeface="Cambria Math" panose="02040503050406030204" pitchFamily="18" charset="0"/>
+                                    </a:rPr>
+                                  </m:ctrlPr>
+                                </m:sSubPr>
+                                <m:e>
+                                  <m:r>
+                                    <a:rPr lang="en-US" altLang="zh-CN" i="1">
+                                      <a:latin typeface="Cambria Math" panose="02040503050406030204" pitchFamily="18" charset="0"/>
+                                    </a:rPr>
+                                    <m:t>𝐴</m:t>
+                                  </m:r>
+                                </m:e>
+                                <m:sub>
+                                  <m:r>
+                                    <a:rPr lang="en-US" altLang="zh-CN" i="1">
+                                      <a:latin typeface="Cambria Math" panose="02040503050406030204" pitchFamily="18" charset="0"/>
+                                    </a:rPr>
+                                    <m:t>1</m:t>
+                                  </m:r>
+                                  <m:r>
+                                    <a:rPr lang="en-US" altLang="zh-CN" b="0" i="1" smtClean="0">
+                                      <a:latin typeface="Cambria Math" panose="02040503050406030204" pitchFamily="18" charset="0"/>
+                                    </a:rPr>
+                                    <m:t>2</m:t>
+                                  </m:r>
+                                </m:sub>
+                              </m:sSub>
+                            </m:e>
+                          </m:mr>
+                          <m:mr>
+                            <m:e>
+                              <m:sSub>
+                                <m:sSubPr>
+                                  <m:ctrlPr>
+                                    <a:rPr lang="en-US" altLang="zh-CN" i="1">
+                                      <a:latin typeface="Cambria Math" panose="02040503050406030204" pitchFamily="18" charset="0"/>
+                                    </a:rPr>
+                                  </m:ctrlPr>
+                                </m:sSubPr>
+                                <m:e>
+                                  <m:r>
+                                    <a:rPr lang="en-US" altLang="zh-CN" i="1">
+                                      <a:latin typeface="Cambria Math" panose="02040503050406030204" pitchFamily="18" charset="0"/>
+                                    </a:rPr>
+                                    <m:t>𝐴</m:t>
+                                  </m:r>
+                                </m:e>
+                                <m:sub>
+                                  <m:r>
+                                    <a:rPr lang="en-US" altLang="zh-CN" b="0" i="1" smtClean="0">
+                                      <a:latin typeface="Cambria Math" panose="02040503050406030204" pitchFamily="18" charset="0"/>
+                                    </a:rPr>
+                                    <m:t>2</m:t>
+                                  </m:r>
+                                  <m:r>
+                                    <a:rPr lang="en-US" altLang="zh-CN" i="1">
+                                      <a:latin typeface="Cambria Math" panose="02040503050406030204" pitchFamily="18" charset="0"/>
+                                    </a:rPr>
+                                    <m:t>1</m:t>
+                                  </m:r>
+                                </m:sub>
+                              </m:sSub>
+                            </m:e>
+                            <m:e>
+                              <m:sSub>
+                                <m:sSubPr>
+                                  <m:ctrlPr>
+                                    <a:rPr lang="en-US" altLang="zh-CN" i="1">
+                                      <a:latin typeface="Cambria Math" panose="02040503050406030204" pitchFamily="18" charset="0"/>
+                                    </a:rPr>
+                                  </m:ctrlPr>
+                                </m:sSubPr>
+                                <m:e>
+                                  <m:r>
+                                    <a:rPr lang="en-US" altLang="zh-CN" i="1">
+                                      <a:latin typeface="Cambria Math" panose="02040503050406030204" pitchFamily="18" charset="0"/>
+                                    </a:rPr>
+                                    <m:t>𝐴</m:t>
+                                  </m:r>
+                                </m:e>
+                                <m:sub>
+                                  <m:r>
+                                    <a:rPr lang="en-US" altLang="zh-CN" b="0" i="1" smtClean="0">
+                                      <a:latin typeface="Cambria Math" panose="02040503050406030204" pitchFamily="18" charset="0"/>
+                                    </a:rPr>
+                                    <m:t>22</m:t>
+                                  </m:r>
+                                </m:sub>
+                              </m:sSub>
+                            </m:e>
+                          </m:mr>
+                        </m:m>
+                      </m:e>
+                    </m:d>
+                    <m:r>
+                      <a:rPr lang="en-US" altLang="zh-CN" b="0" i="1" smtClean="0">
+                        <a:latin typeface="Cambria Math" panose="02040503050406030204" pitchFamily="18" charset="0"/>
+                      </a:rPr>
+                      <m:t>                 </m:t>
+                    </m:r>
+                    <m:r>
+                      <a:rPr lang="en-US" altLang="zh-CN" b="0" i="1" smtClean="0">
+                        <a:latin typeface="Cambria Math" panose="02040503050406030204" pitchFamily="18" charset="0"/>
+                      </a:rPr>
+                      <m:t>𝑀</m:t>
+                    </m:r>
+                    <m:r>
+                      <a:rPr lang="en-US" altLang="zh-CN" b="0" i="1" smtClean="0">
+                        <a:latin typeface="Cambria Math" panose="02040503050406030204" pitchFamily="18" charset="0"/>
+                      </a:rPr>
+                      <m:t>=</m:t>
+                    </m:r>
+                    <m:d>
+                      <m:dPr>
+                        <m:begChr m:val="["/>
+                        <m:endChr m:val="]"/>
+                        <m:ctrlPr>
+                          <a:rPr lang="en-US" altLang="zh-CN" i="1">
+                            <a:latin typeface="Cambria Math" panose="02040503050406030204" pitchFamily="18" charset="0"/>
+                          </a:rPr>
+                        </m:ctrlPr>
+                      </m:dPr>
+                      <m:e>
+                        <m:m>
+                          <m:mPr>
+                            <m:mcs>
+                              <m:mc>
+                                <m:mcPr>
+                                  <m:count m:val="2"/>
+                                  <m:mcJc m:val="center"/>
+                                </m:mcPr>
+                              </m:mc>
+                            </m:mcs>
+                            <m:ctrlPr>
+                              <a:rPr lang="en-US" altLang="zh-CN" i="1">
+                                <a:latin typeface="Cambria Math" panose="02040503050406030204" pitchFamily="18" charset="0"/>
+                              </a:rPr>
+                            </m:ctrlPr>
+                          </m:mPr>
+                          <m:mr>
+                            <m:e>
+                              <m:sSub>
+                                <m:sSubPr>
+                                  <m:ctrlPr>
+                                    <a:rPr lang="en-US" altLang="zh-CN" i="1">
+                                      <a:latin typeface="Cambria Math" panose="02040503050406030204" pitchFamily="18" charset="0"/>
+                                    </a:rPr>
+                                  </m:ctrlPr>
+                                </m:sSubPr>
+                                <m:e>
+                                  <m:r>
+                                    <a:rPr lang="en-US" altLang="zh-CN" i="1">
+                                      <a:latin typeface="Cambria Math" panose="02040503050406030204" pitchFamily="18" charset="0"/>
+                                    </a:rPr>
+                                    <m:t>𝐴</m:t>
+                                  </m:r>
+                                </m:e>
+                                <m:sub>
+                                  <m:r>
+                                    <a:rPr lang="en-US" altLang="zh-CN" i="1">
+                                      <a:latin typeface="Cambria Math" panose="02040503050406030204" pitchFamily="18" charset="0"/>
+                                    </a:rPr>
+                                    <m:t>11</m:t>
+                                  </m:r>
+                                </m:sub>
+                              </m:sSub>
+                            </m:e>
+                            <m:e>
+                              <m:r>
+                                <a:rPr lang="en-US" altLang="zh-CN" b="0" i="1" smtClean="0">
+                                  <a:latin typeface="Cambria Math" panose="02040503050406030204" pitchFamily="18" charset="0"/>
+                                </a:rPr>
+                                <m:t>0</m:t>
+                              </m:r>
+                            </m:e>
+                          </m:mr>
+                          <m:mr>
+                            <m:e>
+                              <m:r>
+                                <a:rPr lang="en-US" altLang="zh-CN" b="0" i="1" smtClean="0">
+                                  <a:latin typeface="Cambria Math" panose="02040503050406030204" pitchFamily="18" charset="0"/>
+                                </a:rPr>
+                                <m:t>0</m:t>
+                              </m:r>
+                            </m:e>
+                            <m:e>
+                              <m:sSub>
+                                <m:sSubPr>
+                                  <m:ctrlPr>
+                                    <a:rPr lang="en-US" altLang="zh-CN" i="1">
+                                      <a:latin typeface="Cambria Math" panose="02040503050406030204" pitchFamily="18" charset="0"/>
+                                    </a:rPr>
+                                  </m:ctrlPr>
+                                </m:sSubPr>
+                                <m:e>
+                                  <m:r>
+                                    <a:rPr lang="en-US" altLang="zh-CN" i="1">
+                                      <a:latin typeface="Cambria Math" panose="02040503050406030204" pitchFamily="18" charset="0"/>
+                                    </a:rPr>
+                                    <m:t>𝐴</m:t>
+                                  </m:r>
+                                </m:e>
+                                <m:sub>
+                                  <m:r>
+                                    <a:rPr lang="en-US" altLang="zh-CN" i="1">
+                                      <a:latin typeface="Cambria Math" panose="02040503050406030204" pitchFamily="18" charset="0"/>
+                                    </a:rPr>
+                                    <m:t>22</m:t>
+                                  </m:r>
+                                </m:sub>
+                              </m:sSub>
+                            </m:e>
+                          </m:mr>
+                        </m:m>
+                      </m:e>
+                    </m:d>
+                    <m:r>
+                      <a:rPr lang="en-US" altLang="zh-CN" i="1" smtClean="0">
+                        <a:latin typeface="Cambria Math" panose="02040503050406030204" pitchFamily="18" charset="0"/>
+                        <a:ea typeface="Cambria Math" panose="02040503050406030204" pitchFamily="18" charset="0"/>
+                      </a:rPr>
+                      <m:t>≈</m:t>
+                    </m:r>
+                    <m:d>
+                      <m:dPr>
+                        <m:begChr m:val="["/>
+                        <m:endChr m:val="]"/>
+                        <m:ctrlPr>
+                          <a:rPr lang="en-US" altLang="zh-CN" i="1">
+                            <a:latin typeface="Cambria Math" panose="02040503050406030204" pitchFamily="18" charset="0"/>
+                          </a:rPr>
+                        </m:ctrlPr>
+                      </m:dPr>
+                      <m:e>
+                        <m:m>
+                          <m:mPr>
+                            <m:mcs>
+                              <m:mc>
+                                <m:mcPr>
+                                  <m:count m:val="2"/>
+                                  <m:mcJc m:val="center"/>
+                                </m:mcPr>
+                              </m:mc>
+                            </m:mcs>
+                            <m:ctrlPr>
+                              <a:rPr lang="en-US" altLang="zh-CN" i="1">
+                                <a:latin typeface="Cambria Math" panose="02040503050406030204" pitchFamily="18" charset="0"/>
+                              </a:rPr>
+                            </m:ctrlPr>
+                          </m:mPr>
+                          <m:mr>
+                            <m:e>
+                              <m:sSub>
+                                <m:sSubPr>
+                                  <m:ctrlPr>
+                                    <a:rPr lang="en-US" altLang="zh-CN" i="1" smtClean="0">
+                                      <a:latin typeface="Cambria Math" panose="02040503050406030204" pitchFamily="18" charset="0"/>
+                                    </a:rPr>
+                                  </m:ctrlPr>
+                                </m:sSubPr>
+                                <m:e>
+                                  <m:r>
+                                    <a:rPr lang="en-US" altLang="zh-CN" b="0" i="1" smtClean="0">
+                                      <a:latin typeface="Cambria Math" panose="02040503050406030204" pitchFamily="18" charset="0"/>
+                                    </a:rPr>
+                                    <m:t>𝐿</m:t>
+                                  </m:r>
+                                </m:e>
+                                <m:sub>
+                                  <m:r>
+                                    <a:rPr lang="en-US" altLang="zh-CN" b="0" i="1" smtClean="0">
+                                      <a:latin typeface="Cambria Math" panose="02040503050406030204" pitchFamily="18" charset="0"/>
+                                    </a:rPr>
+                                    <m:t>1</m:t>
+                                  </m:r>
+                                </m:sub>
+                              </m:sSub>
+                              <m:sSubSup>
+                                <m:sSubSupPr>
+                                  <m:ctrlPr>
+                                    <a:rPr lang="en-US" altLang="zh-CN" i="1" smtClean="0">
+                                      <a:latin typeface="Cambria Math" panose="02040503050406030204" pitchFamily="18" charset="0"/>
+                                    </a:rPr>
+                                  </m:ctrlPr>
+                                </m:sSubSupPr>
+                                <m:e>
+                                  <m:r>
+                                    <a:rPr lang="en-US" altLang="zh-CN" b="0" i="1" smtClean="0">
+                                      <a:latin typeface="Cambria Math" panose="02040503050406030204" pitchFamily="18" charset="0"/>
+                                    </a:rPr>
+                                    <m:t>𝐿</m:t>
+                                  </m:r>
+                                </m:e>
+                                <m:sub>
+                                  <m:r>
+                                    <a:rPr lang="en-US" altLang="zh-CN" b="0" i="1" smtClean="0">
+                                      <a:latin typeface="Cambria Math" panose="02040503050406030204" pitchFamily="18" charset="0"/>
+                                    </a:rPr>
+                                    <m:t>1</m:t>
+                                  </m:r>
+                                </m:sub>
+                                <m:sup>
+                                  <m:r>
+                                    <a:rPr lang="en-US" altLang="zh-CN" b="0" i="1" smtClean="0">
+                                      <a:latin typeface="Cambria Math" panose="02040503050406030204" pitchFamily="18" charset="0"/>
+                                    </a:rPr>
+                                    <m:t>𝑇</m:t>
+                                  </m:r>
+                                </m:sup>
+                              </m:sSubSup>
+                            </m:e>
+                            <m:e>
+                              <m:r>
+                                <a:rPr lang="en-US" altLang="zh-CN" i="1">
+                                  <a:latin typeface="Cambria Math" panose="02040503050406030204" pitchFamily="18" charset="0"/>
+                                </a:rPr>
+                                <m:t>0</m:t>
+                              </m:r>
+                            </m:e>
+                          </m:mr>
+                          <m:mr>
+                            <m:e>
+                              <m:r>
+                                <a:rPr lang="en-US" altLang="zh-CN" i="1">
+                                  <a:latin typeface="Cambria Math" panose="02040503050406030204" pitchFamily="18" charset="0"/>
+                                </a:rPr>
+                                <m:t>0</m:t>
+                              </m:r>
+                            </m:e>
+                            <m:e>
+                              <m:sSub>
+                                <m:sSubPr>
+                                  <m:ctrlPr>
+                                    <a:rPr lang="en-US" altLang="zh-CN" i="1">
+                                      <a:latin typeface="Cambria Math" panose="02040503050406030204" pitchFamily="18" charset="0"/>
+                                    </a:rPr>
+                                  </m:ctrlPr>
+                                </m:sSubPr>
+                                <m:e>
+                                  <m:r>
+                                    <a:rPr lang="en-US" altLang="zh-CN" i="1">
+                                      <a:latin typeface="Cambria Math" panose="02040503050406030204" pitchFamily="18" charset="0"/>
+                                    </a:rPr>
+                                    <m:t>𝐿</m:t>
+                                  </m:r>
+                                </m:e>
+                                <m:sub>
+                                  <m:r>
+                                    <a:rPr lang="en-US" altLang="zh-CN" b="0" i="1" smtClean="0">
+                                      <a:latin typeface="Cambria Math" panose="02040503050406030204" pitchFamily="18" charset="0"/>
+                                    </a:rPr>
+                                    <m:t>2</m:t>
+                                  </m:r>
+                                </m:sub>
+                              </m:sSub>
+                              <m:sSubSup>
+                                <m:sSubSupPr>
+                                  <m:ctrlPr>
+                                    <a:rPr lang="en-US" altLang="zh-CN" i="1">
+                                      <a:latin typeface="Cambria Math" panose="02040503050406030204" pitchFamily="18" charset="0"/>
+                                    </a:rPr>
+                                  </m:ctrlPr>
+                                </m:sSubSupPr>
+                                <m:e>
+                                  <m:r>
+                                    <a:rPr lang="en-US" altLang="zh-CN" i="1">
+                                      <a:latin typeface="Cambria Math" panose="02040503050406030204" pitchFamily="18" charset="0"/>
+                                    </a:rPr>
+                                    <m:t>𝐿</m:t>
+                                  </m:r>
+                                </m:e>
+                                <m:sub>
+                                  <m:r>
+                                    <a:rPr lang="en-US" altLang="zh-CN" b="0" i="1" smtClean="0">
+                                      <a:latin typeface="Cambria Math" panose="02040503050406030204" pitchFamily="18" charset="0"/>
+                                    </a:rPr>
+                                    <m:t>2</m:t>
+                                  </m:r>
+                                </m:sub>
+                                <m:sup>
+                                  <m:r>
+                                    <a:rPr lang="en-US" altLang="zh-CN" i="1">
+                                      <a:latin typeface="Cambria Math" panose="02040503050406030204" pitchFamily="18" charset="0"/>
+                                    </a:rPr>
+                                    <m:t>𝑇</m:t>
+                                  </m:r>
+                                </m:sup>
+                              </m:sSubSup>
+                            </m:e>
+                          </m:mr>
+                        </m:m>
+                      </m:e>
+                    </m:d>
+                  </m:oMath>
+                </a14:m>
+                <a:endParaRPr lang="en-US" altLang="zh-CN" dirty="0"/>
+              </a:p>
+              <a:p>
+                <a:r>
+                  <a:rPr lang="zh-CN" altLang="en-US" dirty="0"/>
+                  <a:t>单级低秩修正预条件子</a:t>
+                </a:r>
+                <a:endParaRPr lang="en-US" altLang="zh-CN" dirty="0"/>
+              </a:p>
+              <a:p>
+                <a:pPr lvl="1"/>
+                <a14:m>
+                  <m:oMath xmlns:m="http://schemas.openxmlformats.org/officeDocument/2006/math">
+                    <m:r>
+                      <a:rPr lang="en-US" altLang="zh-CN" b="0" i="1" smtClean="0">
+                        <a:latin typeface="Cambria Math" panose="02040503050406030204" pitchFamily="18" charset="0"/>
+                      </a:rPr>
+                      <m:t>𝐵</m:t>
+                    </m:r>
+                    <m:r>
+                      <a:rPr lang="en-US" altLang="zh-CN" b="0" i="1" smtClean="0">
+                        <a:latin typeface="Cambria Math" panose="02040503050406030204" pitchFamily="18" charset="0"/>
+                      </a:rPr>
+                      <m:t>=</m:t>
+                    </m:r>
+                    <m:d>
+                      <m:dPr>
+                        <m:begChr m:val="["/>
+                        <m:endChr m:val="]"/>
+                        <m:ctrlPr>
+                          <a:rPr lang="en-US" altLang="zh-CN" i="1">
+                            <a:latin typeface="Cambria Math" panose="02040503050406030204" pitchFamily="18" charset="0"/>
+                          </a:rPr>
+                        </m:ctrlPr>
+                      </m:dPr>
+                      <m:e>
+                        <m:m>
+                          <m:mPr>
+                            <m:mcs>
+                              <m:mc>
+                                <m:mcPr>
+                                  <m:count m:val="2"/>
+                                  <m:mcJc m:val="center"/>
+                                </m:mcPr>
+                              </m:mc>
+                            </m:mcs>
+                            <m:ctrlPr>
+                              <a:rPr lang="en-US" altLang="zh-CN" i="1">
+                                <a:latin typeface="Cambria Math" panose="02040503050406030204" pitchFamily="18" charset="0"/>
+                              </a:rPr>
+                            </m:ctrlPr>
+                          </m:mPr>
+                          <m:mr>
+                            <m:e>
+                              <m:sSub>
+                                <m:sSubPr>
+                                  <m:ctrlPr>
+                                    <a:rPr lang="en-US" altLang="zh-CN" i="1">
+                                      <a:latin typeface="Cambria Math" panose="02040503050406030204" pitchFamily="18" charset="0"/>
+                                    </a:rPr>
+                                  </m:ctrlPr>
+                                </m:sSubPr>
+                                <m:e>
+                                  <m:r>
+                                    <a:rPr lang="en-US" altLang="zh-CN" i="1">
+                                      <a:latin typeface="Cambria Math" panose="02040503050406030204" pitchFamily="18" charset="0"/>
+                                    </a:rPr>
+                                    <m:t>𝐴</m:t>
+                                  </m:r>
+                                </m:e>
+                                <m:sub>
+                                  <m:r>
+                                    <a:rPr lang="en-US" altLang="zh-CN" i="1">
+                                      <a:latin typeface="Cambria Math" panose="02040503050406030204" pitchFamily="18" charset="0"/>
+                                    </a:rPr>
+                                    <m:t>11</m:t>
+                                  </m:r>
+                                </m:sub>
+                              </m:sSub>
+                              <m:r>
+                                <a:rPr lang="en-US" altLang="zh-CN" b="0" i="1" smtClean="0">
+                                  <a:latin typeface="Cambria Math" panose="02040503050406030204" pitchFamily="18" charset="0"/>
+                                </a:rPr>
+                                <m:t>+</m:t>
+                              </m:r>
+                              <m:sSub>
+                                <m:sSubPr>
+                                  <m:ctrlPr>
+                                    <a:rPr lang="en-US" altLang="zh-CN" i="1">
+                                      <a:latin typeface="Cambria Math" panose="02040503050406030204" pitchFamily="18" charset="0"/>
+                                    </a:rPr>
+                                  </m:ctrlPr>
+                                </m:sSubPr>
+                                <m:e>
+                                  <m:r>
+                                    <a:rPr lang="en-US" altLang="zh-CN" b="0" i="1" smtClean="0">
+                                      <a:latin typeface="Cambria Math" panose="02040503050406030204" pitchFamily="18" charset="0"/>
+                                    </a:rPr>
+                                    <m:t>𝐸</m:t>
+                                  </m:r>
+                                </m:e>
+                                <m:sub>
+                                  <m:r>
+                                    <a:rPr lang="en-US" altLang="zh-CN" i="1">
+                                      <a:latin typeface="Cambria Math" panose="02040503050406030204" pitchFamily="18" charset="0"/>
+                                    </a:rPr>
+                                    <m:t>1</m:t>
+                                  </m:r>
+                                </m:sub>
+                              </m:sSub>
+                              <m:sSubSup>
+                                <m:sSubSupPr>
+                                  <m:ctrlPr>
+                                    <a:rPr lang="en-US" altLang="zh-CN" i="1">
+                                      <a:latin typeface="Cambria Math" panose="02040503050406030204" pitchFamily="18" charset="0"/>
+                                    </a:rPr>
+                                  </m:ctrlPr>
+                                </m:sSubSupPr>
+                                <m:e>
+                                  <m:r>
+                                    <a:rPr lang="en-US" altLang="zh-CN" b="0" i="1" smtClean="0">
+                                      <a:latin typeface="Cambria Math" panose="02040503050406030204" pitchFamily="18" charset="0"/>
+                                    </a:rPr>
+                                    <m:t>𝐸</m:t>
+                                  </m:r>
+                                </m:e>
+                                <m:sub>
+                                  <m:r>
+                                    <a:rPr lang="en-US" altLang="zh-CN" i="1">
+                                      <a:latin typeface="Cambria Math" panose="02040503050406030204" pitchFamily="18" charset="0"/>
+                                    </a:rPr>
+                                    <m:t>1</m:t>
+                                  </m:r>
+                                </m:sub>
+                                <m:sup>
+                                  <m:r>
+                                    <a:rPr lang="en-US" altLang="zh-CN" i="1">
+                                      <a:latin typeface="Cambria Math" panose="02040503050406030204" pitchFamily="18" charset="0"/>
+                                    </a:rPr>
+                                    <m:t>𝑇</m:t>
+                                  </m:r>
+                                </m:sup>
+                              </m:sSubSup>
+                            </m:e>
+                            <m:e>
+                              <m:r>
+                                <a:rPr lang="en-US" altLang="zh-CN" i="1">
+                                  <a:latin typeface="Cambria Math" panose="02040503050406030204" pitchFamily="18" charset="0"/>
+                                </a:rPr>
+                                <m:t>0</m:t>
+                              </m:r>
+                            </m:e>
+                          </m:mr>
+                          <m:mr>
+                            <m:e>
+                              <m:r>
+                                <a:rPr lang="en-US" altLang="zh-CN" i="1">
+                                  <a:latin typeface="Cambria Math" panose="02040503050406030204" pitchFamily="18" charset="0"/>
+                                </a:rPr>
+                                <m:t>0</m:t>
+                              </m:r>
+                            </m:e>
+                            <m:e>
+                              <m:sSub>
+                                <m:sSubPr>
+                                  <m:ctrlPr>
+                                    <a:rPr lang="en-US" altLang="zh-CN" i="1">
+                                      <a:latin typeface="Cambria Math" panose="02040503050406030204" pitchFamily="18" charset="0"/>
+                                    </a:rPr>
+                                  </m:ctrlPr>
+                                </m:sSubPr>
+                                <m:e>
+                                  <m:r>
+                                    <a:rPr lang="en-US" altLang="zh-CN" i="1">
+                                      <a:latin typeface="Cambria Math" panose="02040503050406030204" pitchFamily="18" charset="0"/>
+                                    </a:rPr>
+                                    <m:t>𝐴</m:t>
+                                  </m:r>
+                                </m:e>
+                                <m:sub>
+                                  <m:r>
+                                    <a:rPr lang="en-US" altLang="zh-CN" i="1">
+                                      <a:latin typeface="Cambria Math" panose="02040503050406030204" pitchFamily="18" charset="0"/>
+                                    </a:rPr>
+                                    <m:t>22</m:t>
+                                  </m:r>
+                                </m:sub>
+                              </m:sSub>
+                              <m:r>
+                                <a:rPr lang="en-US" altLang="zh-CN" b="0" i="1" smtClean="0">
+                                  <a:latin typeface="Cambria Math" panose="02040503050406030204" pitchFamily="18" charset="0"/>
+                                </a:rPr>
+                                <m:t>+</m:t>
+                              </m:r>
+                              <m:sSub>
+                                <m:sSubPr>
+                                  <m:ctrlPr>
+                                    <a:rPr lang="en-US" altLang="zh-CN" i="1">
+                                      <a:latin typeface="Cambria Math" panose="02040503050406030204" pitchFamily="18" charset="0"/>
+                                    </a:rPr>
+                                  </m:ctrlPr>
+                                </m:sSubPr>
+                                <m:e>
+                                  <m:r>
+                                    <a:rPr lang="en-US" altLang="zh-CN" b="0" i="1" smtClean="0">
+                                      <a:latin typeface="Cambria Math" panose="02040503050406030204" pitchFamily="18" charset="0"/>
+                                    </a:rPr>
+                                    <m:t>𝐸</m:t>
+                                  </m:r>
+                                </m:e>
+                                <m:sub>
+                                  <m:r>
+                                    <a:rPr lang="en-US" altLang="zh-CN" b="0" i="1" smtClean="0">
+                                      <a:latin typeface="Cambria Math" panose="02040503050406030204" pitchFamily="18" charset="0"/>
+                                    </a:rPr>
+                                    <m:t>2</m:t>
+                                  </m:r>
+                                </m:sub>
+                              </m:sSub>
+                              <m:sSubSup>
+                                <m:sSubSupPr>
+                                  <m:ctrlPr>
+                                    <a:rPr lang="en-US" altLang="zh-CN" i="1">
+                                      <a:latin typeface="Cambria Math" panose="02040503050406030204" pitchFamily="18" charset="0"/>
+                                    </a:rPr>
+                                  </m:ctrlPr>
+                                </m:sSubSupPr>
+                                <m:e>
+                                  <m:r>
+                                    <a:rPr lang="en-US" altLang="zh-CN" b="0" i="1" smtClean="0">
+                                      <a:latin typeface="Cambria Math" panose="02040503050406030204" pitchFamily="18" charset="0"/>
+                                    </a:rPr>
+                                    <m:t>𝐸</m:t>
+                                  </m:r>
+                                </m:e>
+                                <m:sub>
+                                  <m:r>
+                                    <a:rPr lang="en-US" altLang="zh-CN" b="0" i="1" smtClean="0">
+                                      <a:latin typeface="Cambria Math" panose="02040503050406030204" pitchFamily="18" charset="0"/>
+                                    </a:rPr>
+                                    <m:t>2</m:t>
+                                  </m:r>
+                                </m:sub>
+                                <m:sup>
+                                  <m:r>
+                                    <a:rPr lang="en-US" altLang="zh-CN" i="1">
+                                      <a:latin typeface="Cambria Math" panose="02040503050406030204" pitchFamily="18" charset="0"/>
+                                    </a:rPr>
+                                    <m:t>𝑇</m:t>
+                                  </m:r>
+                                </m:sup>
+                              </m:sSubSup>
+                            </m:e>
+                          </m:mr>
+                        </m:m>
+                      </m:e>
+                    </m:d>
+                    <m:r>
+                      <a:rPr lang="en-US" altLang="zh-CN" b="0" i="1" smtClean="0">
+                        <a:latin typeface="Cambria Math" panose="02040503050406030204" pitchFamily="18" charset="0"/>
+                      </a:rPr>
+                      <m:t>=</m:t>
+                    </m:r>
+                    <m:r>
+                      <a:rPr lang="en-US" altLang="zh-CN" b="0" i="1" smtClean="0">
+                        <a:latin typeface="Cambria Math" panose="02040503050406030204" pitchFamily="18" charset="0"/>
+                      </a:rPr>
+                      <m:t>𝐴</m:t>
+                    </m:r>
+                    <m:r>
+                      <a:rPr lang="en-US" altLang="zh-CN" b="0" i="1" smtClean="0">
+                        <a:latin typeface="Cambria Math" panose="02040503050406030204" pitchFamily="18" charset="0"/>
+                      </a:rPr>
+                      <m:t>−</m:t>
+                    </m:r>
+                    <m:r>
+                      <a:rPr lang="en-US" altLang="zh-CN" b="0" i="1" smtClean="0">
+                        <a:latin typeface="Cambria Math" panose="02040503050406030204" pitchFamily="18" charset="0"/>
+                      </a:rPr>
+                      <m:t>𝐸</m:t>
+                    </m:r>
+                    <m:sSup>
+                      <m:sSupPr>
+                        <m:ctrlPr>
+                          <a:rPr lang="en-US" altLang="zh-CN" b="0" i="1" smtClean="0">
+                            <a:latin typeface="Cambria Math" panose="02040503050406030204" pitchFamily="18" charset="0"/>
+                          </a:rPr>
+                        </m:ctrlPr>
+                      </m:sSupPr>
+                      <m:e>
+                        <m:r>
+                          <a:rPr lang="en-US" altLang="zh-CN" b="0" i="1" smtClean="0">
+                            <a:latin typeface="Cambria Math" panose="02040503050406030204" pitchFamily="18" charset="0"/>
+                          </a:rPr>
+                          <m:t>𝐸</m:t>
+                        </m:r>
+                      </m:e>
+                      <m:sup>
+                        <m:r>
+                          <a:rPr lang="en-US" altLang="zh-CN" b="0" i="1" smtClean="0">
+                            <a:latin typeface="Cambria Math" panose="02040503050406030204" pitchFamily="18" charset="0"/>
+                          </a:rPr>
+                          <m:t>𝑇</m:t>
+                        </m:r>
+                      </m:sup>
+                    </m:sSup>
+                    <m:r>
+                      <a:rPr lang="en-US" altLang="zh-CN" b="0" i="1" smtClean="0">
+                        <a:latin typeface="Cambria Math" panose="02040503050406030204" pitchFamily="18" charset="0"/>
+                      </a:rPr>
+                      <m:t>                 </m:t>
+                    </m:r>
+                    <m:sSup>
+                      <m:sSupPr>
+                        <m:ctrlPr>
+                          <a:rPr lang="en-US" altLang="zh-CN" b="0" i="1" smtClean="0">
+                            <a:latin typeface="Cambria Math" panose="02040503050406030204" pitchFamily="18" charset="0"/>
+                          </a:rPr>
+                        </m:ctrlPr>
+                      </m:sSupPr>
+                      <m:e>
+                        <m:r>
+                          <a:rPr lang="en-US" altLang="zh-CN" b="0" i="1" smtClean="0">
+                            <a:latin typeface="Cambria Math" panose="02040503050406030204" pitchFamily="18" charset="0"/>
+                          </a:rPr>
+                          <m:t>𝑀</m:t>
+                        </m:r>
+                      </m:e>
+                      <m:sup>
+                        <m:r>
+                          <a:rPr lang="en-US" altLang="zh-CN" b="0" i="1" smtClean="0">
+                            <a:latin typeface="Cambria Math" panose="02040503050406030204" pitchFamily="18" charset="0"/>
+                          </a:rPr>
+                          <m:t>−1</m:t>
+                        </m:r>
+                      </m:sup>
+                    </m:sSup>
+                    <m:r>
+                      <a:rPr lang="en-US" altLang="zh-CN" b="0" i="1" smtClean="0">
+                        <a:latin typeface="Cambria Math" panose="02040503050406030204" pitchFamily="18" charset="0"/>
+                      </a:rPr>
+                      <m:t>=</m:t>
+                    </m:r>
+                    <m:sSup>
+                      <m:sSupPr>
+                        <m:ctrlPr>
+                          <a:rPr lang="en-US" altLang="zh-CN" i="1">
+                            <a:latin typeface="Cambria Math" panose="02040503050406030204" pitchFamily="18" charset="0"/>
+                          </a:rPr>
+                        </m:ctrlPr>
+                      </m:sSupPr>
+                      <m:e>
+                        <m:r>
+                          <a:rPr lang="en-US" altLang="zh-CN" b="0" i="1" smtClean="0">
+                            <a:latin typeface="Cambria Math" panose="02040503050406030204" pitchFamily="18" charset="0"/>
+                          </a:rPr>
+                          <m:t>𝐵</m:t>
+                        </m:r>
+                      </m:e>
+                      <m:sup>
+                        <m:r>
+                          <a:rPr lang="en-US" altLang="zh-CN" i="1">
+                            <a:latin typeface="Cambria Math" panose="02040503050406030204" pitchFamily="18" charset="0"/>
+                          </a:rPr>
+                          <m:t>−1</m:t>
+                        </m:r>
+                      </m:sup>
+                    </m:sSup>
+                    <m:r>
+                      <a:rPr lang="en-US" altLang="zh-CN" b="0" i="1" smtClean="0">
+                        <a:latin typeface="Cambria Math" panose="02040503050406030204" pitchFamily="18" charset="0"/>
+                      </a:rPr>
+                      <m:t>+</m:t>
+                    </m:r>
+                    <m:r>
+                      <a:rPr lang="en-US" altLang="zh-CN" b="0" i="1" smtClean="0">
+                        <a:latin typeface="Cambria Math" panose="02040503050406030204" pitchFamily="18" charset="0"/>
+                      </a:rPr>
+                      <m:t>𝑈𝐻</m:t>
+                    </m:r>
+                    <m:sSup>
+                      <m:sSupPr>
+                        <m:ctrlPr>
+                          <a:rPr lang="en-US" altLang="zh-CN" b="0" i="1" smtClean="0">
+                            <a:latin typeface="Cambria Math" panose="02040503050406030204" pitchFamily="18" charset="0"/>
+                          </a:rPr>
+                        </m:ctrlPr>
+                      </m:sSupPr>
+                      <m:e>
+                        <m:r>
+                          <a:rPr lang="en-US" altLang="zh-CN" b="0" i="1" smtClean="0">
+                            <a:latin typeface="Cambria Math" panose="02040503050406030204" pitchFamily="18" charset="0"/>
+                          </a:rPr>
+                          <m:t>𝑈</m:t>
+                        </m:r>
+                      </m:e>
+                      <m:sup>
+                        <m:r>
+                          <a:rPr lang="en-US" altLang="zh-CN" b="0" i="1" smtClean="0">
+                            <a:latin typeface="Cambria Math" panose="02040503050406030204" pitchFamily="18" charset="0"/>
+                          </a:rPr>
+                          <m:t>𝑇</m:t>
+                        </m:r>
+                      </m:sup>
+                    </m:sSup>
+                  </m:oMath>
+                </a14:m>
+                <a:endParaRPr lang="en-US" dirty="0"/>
+              </a:p>
+              <a:p>
+                <a:endParaRPr lang="en-US" dirty="0"/>
+              </a:p>
+              <a:p>
+                <a:endParaRPr lang="en-US" dirty="0"/>
+              </a:p>
+            </p:txBody>
+          </p:sp>
+        </mc:Choice>
+        <mc:Fallback>
+          <p:sp>
+            <p:nvSpPr>
+              <p:cNvPr id="4" name="Content Placeholder 3">
+                <a:extLst>
+                  <a:ext uri="{FF2B5EF4-FFF2-40B4-BE49-F238E27FC236}">
+                    <a16:creationId xmlns:a16="http://schemas.microsoft.com/office/drawing/2014/main" id="{41B29A9D-7C58-48D0-A432-C63F041C38DE}"/>
+                  </a:ext>
+                </a:extLst>
+              </p:cNvPr>
+              <p:cNvSpPr>
+                <a:spLocks noGrp="1" noRot="1" noChangeAspect="1" noMove="1" noResize="1" noEditPoints="1" noAdjustHandles="1" noChangeArrowheads="1" noChangeShapeType="1" noTextEdit="1"/>
+              </p:cNvSpPr>
+              <p:nvPr>
+                <p:ph idx="1"/>
+              </p:nvPr>
+            </p:nvSpPr>
+            <p:spPr>
+              <a:blipFill>
+                <a:blip r:embed="rId2"/>
+                <a:stretch>
+                  <a:fillRect l="-762" t="-2752"/>
+                </a:stretch>
+              </a:blipFill>
+            </p:spPr>
+            <p:txBody>
+              <a:bodyPr/>
+              <a:lstStyle/>
+              <a:p>
+                <a:r>
+                  <a:rPr lang="zh-CN" altLang="en-US">
+                    <a:noFill/>
+                  </a:rPr>
+                  <a:t> </a:t>
+                </a:r>
+              </a:p>
+            </p:txBody>
+          </p:sp>
+        </mc:Fallback>
+      </mc:AlternateContent>
+    </p:spTree>
+    <p:extLst>
+      <p:ext uri="{BB962C8B-B14F-4D97-AF65-F5344CB8AC3E}">
+        <p14:creationId xmlns:p14="http://schemas.microsoft.com/office/powerpoint/2010/main" val="2342158260"/>
+      </p:ext>
+    </p:extLst>
+  </p:cSld>
+  <p:clrMapOvr>
+    <a:masterClrMapping/>
+  </p:clrMapOvr>
+</p:sld>
+</file>
+
+<file path=ppt/slides/slide14.xml><?xml version="1.0" encoding="utf-8"?>
+<p:sld xmlns:a="http://schemas.openxmlformats.org/drawingml/2006/main" xmlns:r="http://schemas.openxmlformats.org/officeDocument/2006/relationships" xmlns:p="http://schemas.openxmlformats.org/presentationml/2006/main">
+  <p:cSld>
+    <p:spTree>
+      <p:nvGrpSpPr>
+        <p:cNvPr id="1" name=""/>
+        <p:cNvGrpSpPr/>
+        <p:nvPr/>
+      </p:nvGrpSpPr>
+      <p:grpSpPr>
+        <a:xfrm>
+          <a:off x="0" y="0"/>
+          <a:ext cx="0" cy="0"/>
+          <a:chOff x="0" y="0"/>
+          <a:chExt cx="0" cy="0"/>
+        </a:xfrm>
+      </p:grpSpPr>
+      <p:sp>
+        <p:nvSpPr>
+          <p:cNvPr id="2" name="Title 1">
+            <a:extLst>
+              <a:ext uri="{FF2B5EF4-FFF2-40B4-BE49-F238E27FC236}">
+                <a16:creationId xmlns:a16="http://schemas.microsoft.com/office/drawing/2014/main" id="{08FA0447-EE8A-4FD4-9B2F-50CE44D80D06}"/>
+              </a:ext>
+            </a:extLst>
+          </p:cNvPr>
+          <p:cNvSpPr>
+            <a:spLocks noGrp="1"/>
+          </p:cNvSpPr>
+          <p:nvPr>
+            <p:ph type="title"/>
+          </p:nvPr>
+        </p:nvSpPr>
+        <p:spPr/>
+        <p:txBody>
+          <a:bodyPr/>
+          <a:lstStyle/>
+          <a:p>
+            <a:pPr algn="l"/>
+            <a:r>
+              <a:rPr lang="zh-CN" altLang="en-US" dirty="0"/>
+              <a:t>当前进展</a:t>
+            </a:r>
+            <a:endParaRPr lang="en-US" dirty="0"/>
+          </a:p>
+        </p:txBody>
+      </p:sp>
+      <p:sp>
+        <p:nvSpPr>
+          <p:cNvPr id="4" name="Content Placeholder 3">
+            <a:extLst>
+              <a:ext uri="{FF2B5EF4-FFF2-40B4-BE49-F238E27FC236}">
+                <a16:creationId xmlns:a16="http://schemas.microsoft.com/office/drawing/2014/main" id="{41B29A9D-7C58-48D0-A432-C63F041C38DE}"/>
+              </a:ext>
+            </a:extLst>
+          </p:cNvPr>
+          <p:cNvSpPr>
+            <a:spLocks noGrp="1"/>
+          </p:cNvSpPr>
+          <p:nvPr>
+            <p:ph idx="1"/>
+          </p:nvPr>
+        </p:nvSpPr>
+        <p:spPr/>
+        <p:txBody>
+          <a:bodyPr>
+            <a:normAutofit/>
+          </a:bodyPr>
+          <a:lstStyle/>
+          <a:p>
+            <a:endParaRPr lang="en-US" dirty="0"/>
+          </a:p>
+          <a:p>
+            <a:endParaRPr lang="en-US" dirty="0"/>
+          </a:p>
+        </p:txBody>
+      </p:sp>
+      <p:graphicFrame>
+        <p:nvGraphicFramePr>
+          <p:cNvPr id="3" name="表格 2">
+            <a:extLst>
+              <a:ext uri="{FF2B5EF4-FFF2-40B4-BE49-F238E27FC236}">
+                <a16:creationId xmlns:a16="http://schemas.microsoft.com/office/drawing/2014/main" id="{529204C5-1626-4C37-AED5-1C034C5AA996}"/>
+              </a:ext>
+            </a:extLst>
+          </p:cNvPr>
+          <p:cNvGraphicFramePr>
+            <a:graphicFrameLocks noGrp="1"/>
+          </p:cNvGraphicFramePr>
+          <p:nvPr>
+            <p:extLst>
+              <p:ext uri="{D42A27DB-BD31-4B8C-83A1-F6EECF244321}">
+                <p14:modId xmlns:p14="http://schemas.microsoft.com/office/powerpoint/2010/main" val="4239211470"/>
+              </p:ext>
+            </p:extLst>
+          </p:nvPr>
+        </p:nvGraphicFramePr>
+        <p:xfrm>
+          <a:off x="1295401" y="2669764"/>
+          <a:ext cx="8128002" cy="1112520"/>
+        </p:xfrm>
+        <a:graphic>
+          <a:graphicData uri="http://schemas.openxmlformats.org/drawingml/2006/table">
+            <a:tbl>
+              <a:tblPr firstRow="1" bandRow="1">
+                <a:tableStyleId>{5C22544A-7EE6-4342-B048-85BDC9FD1C3A}</a:tableStyleId>
+              </a:tblPr>
+              <a:tblGrid>
+                <a:gridCol w="1354667">
+                  <a:extLst>
+                    <a:ext uri="{9D8B030D-6E8A-4147-A177-3AD203B41FA5}">
+                      <a16:colId xmlns:a16="http://schemas.microsoft.com/office/drawing/2014/main" val="36064090"/>
+                    </a:ext>
+                  </a:extLst>
+                </a:gridCol>
+                <a:gridCol w="1354667">
+                  <a:extLst>
+                    <a:ext uri="{9D8B030D-6E8A-4147-A177-3AD203B41FA5}">
+                      <a16:colId xmlns:a16="http://schemas.microsoft.com/office/drawing/2014/main" val="2307239823"/>
+                    </a:ext>
+                  </a:extLst>
+                </a:gridCol>
+                <a:gridCol w="1354667">
+                  <a:extLst>
+                    <a:ext uri="{9D8B030D-6E8A-4147-A177-3AD203B41FA5}">
+                      <a16:colId xmlns:a16="http://schemas.microsoft.com/office/drawing/2014/main" val="1823078916"/>
+                    </a:ext>
+                  </a:extLst>
+                </a:gridCol>
+                <a:gridCol w="1354667">
+                  <a:extLst>
+                    <a:ext uri="{9D8B030D-6E8A-4147-A177-3AD203B41FA5}">
+                      <a16:colId xmlns:a16="http://schemas.microsoft.com/office/drawing/2014/main" val="3094052347"/>
+                    </a:ext>
+                  </a:extLst>
+                </a:gridCol>
+                <a:gridCol w="1354667">
+                  <a:extLst>
+                    <a:ext uri="{9D8B030D-6E8A-4147-A177-3AD203B41FA5}">
+                      <a16:colId xmlns:a16="http://schemas.microsoft.com/office/drawing/2014/main" val="978203811"/>
+                    </a:ext>
+                  </a:extLst>
+                </a:gridCol>
+                <a:gridCol w="1354667">
+                  <a:extLst>
+                    <a:ext uri="{9D8B030D-6E8A-4147-A177-3AD203B41FA5}">
+                      <a16:colId xmlns:a16="http://schemas.microsoft.com/office/drawing/2014/main" val="2903178933"/>
+                    </a:ext>
+                  </a:extLst>
+                </a:gridCol>
+              </a:tblGrid>
+              <a:tr h="370840">
+                <a:tc>
+                  <a:txBody>
+                    <a:bodyPr/>
+                    <a:lstStyle/>
+                    <a:p>
+                      <a:r>
+                        <a:rPr lang="zh-CN" altLang="en-US" dirty="0"/>
+                        <a:t>问题规模</a:t>
+                      </a:r>
+                    </a:p>
+                  </a:txBody>
+                  <a:tcPr/>
+                </a:tc>
+                <a:tc>
+                  <a:txBody>
+                    <a:bodyPr/>
+                    <a:lstStyle/>
+                    <a:p>
+                      <a:r>
+                        <a:rPr lang="en-US" altLang="zh-CN" dirty="0"/>
+                        <a:t>100*100</a:t>
+                      </a:r>
+                      <a:endParaRPr lang="zh-CN" altLang="en-US" dirty="0"/>
+                    </a:p>
+                  </a:txBody>
+                  <a:tcPr/>
+                </a:tc>
+                <a:tc>
+                  <a:txBody>
+                    <a:bodyPr/>
+                    <a:lstStyle/>
+                    <a:p>
+                      <a:r>
+                        <a:rPr lang="en-US" altLang="zh-CN" dirty="0"/>
+                        <a:t>150*150</a:t>
+                      </a:r>
+                      <a:endParaRPr lang="zh-CN" altLang="en-US" dirty="0"/>
+                    </a:p>
+                  </a:txBody>
+                  <a:tcPr/>
+                </a:tc>
+                <a:tc>
+                  <a:txBody>
+                    <a:bodyPr/>
+                    <a:lstStyle/>
+                    <a:p>
+                      <a:r>
+                        <a:rPr lang="en-US" altLang="zh-CN" dirty="0"/>
+                        <a:t>200*200</a:t>
+                      </a:r>
+                      <a:endParaRPr lang="zh-CN" altLang="en-US" dirty="0"/>
+                    </a:p>
+                  </a:txBody>
+                  <a:tcPr/>
+                </a:tc>
+                <a:tc>
+                  <a:txBody>
+                    <a:bodyPr/>
+                    <a:lstStyle/>
+                    <a:p>
+                      <a:r>
+                        <a:rPr lang="en-US" altLang="zh-CN" dirty="0"/>
+                        <a:t>250*250</a:t>
+                      </a:r>
+                      <a:endParaRPr lang="zh-CN" altLang="en-US" dirty="0"/>
+                    </a:p>
+                  </a:txBody>
+                  <a:tcPr/>
+                </a:tc>
+                <a:tc>
+                  <a:txBody>
+                    <a:bodyPr/>
+                    <a:lstStyle/>
+                    <a:p>
+                      <a:r>
+                        <a:rPr lang="en-US" altLang="zh-CN" dirty="0"/>
+                        <a:t>300*300</a:t>
+                      </a:r>
+                      <a:endParaRPr lang="zh-CN" altLang="en-US" dirty="0"/>
+                    </a:p>
+                  </a:txBody>
+                  <a:tcPr/>
+                </a:tc>
+                <a:extLst>
+                  <a:ext uri="{0D108BD9-81ED-4DB2-BD59-A6C34878D82A}">
+                    <a16:rowId xmlns:a16="http://schemas.microsoft.com/office/drawing/2014/main" val="3433995149"/>
+                  </a:ext>
+                </a:extLst>
+              </a:tr>
+              <a:tr h="370840">
+                <a:tc>
+                  <a:txBody>
+                    <a:bodyPr/>
+                    <a:lstStyle/>
+                    <a:p>
+                      <a:r>
+                        <a:rPr lang="en-US" altLang="zh-CN" dirty="0" err="1"/>
+                        <a:t>Bjacob</a:t>
+                      </a:r>
+                      <a:endParaRPr lang="zh-CN" altLang="en-US" dirty="0"/>
+                    </a:p>
+                  </a:txBody>
+                  <a:tcPr/>
+                </a:tc>
+                <a:tc>
+                  <a:txBody>
+                    <a:bodyPr/>
+                    <a:lstStyle/>
+                    <a:p>
+                      <a:r>
+                        <a:rPr lang="en-US" altLang="zh-CN" dirty="0"/>
+                        <a:t>69</a:t>
+                      </a:r>
+                      <a:endParaRPr lang="zh-CN" altLang="en-US" dirty="0"/>
+                    </a:p>
+                  </a:txBody>
+                  <a:tcPr/>
+                </a:tc>
+                <a:tc>
+                  <a:txBody>
+                    <a:bodyPr/>
+                    <a:lstStyle/>
+                    <a:p>
+                      <a:r>
+                        <a:rPr lang="en-US" altLang="zh-CN" dirty="0"/>
+                        <a:t>100</a:t>
+                      </a:r>
+                      <a:endParaRPr lang="zh-CN" altLang="en-US" dirty="0"/>
+                    </a:p>
+                  </a:txBody>
+                  <a:tcPr/>
+                </a:tc>
+                <a:tc>
+                  <a:txBody>
+                    <a:bodyPr/>
+                    <a:lstStyle/>
+                    <a:p>
+                      <a:r>
+                        <a:rPr lang="en-US" altLang="zh-CN" dirty="0"/>
+                        <a:t>129</a:t>
+                      </a:r>
+                      <a:endParaRPr lang="zh-CN" altLang="en-US" dirty="0"/>
+                    </a:p>
+                  </a:txBody>
+                  <a:tcPr/>
+                </a:tc>
+                <a:tc>
+                  <a:txBody>
+                    <a:bodyPr/>
+                    <a:lstStyle/>
+                    <a:p>
+                      <a:r>
+                        <a:rPr lang="en-US" altLang="zh-CN" dirty="0"/>
+                        <a:t>157</a:t>
+                      </a:r>
+                      <a:endParaRPr lang="zh-CN" altLang="en-US" dirty="0"/>
+                    </a:p>
+                  </a:txBody>
+                  <a:tcPr/>
+                </a:tc>
+                <a:tc>
+                  <a:txBody>
+                    <a:bodyPr/>
+                    <a:lstStyle/>
+                    <a:p>
+                      <a:r>
+                        <a:rPr lang="en-US" altLang="zh-CN" dirty="0"/>
+                        <a:t>184</a:t>
+                      </a:r>
+                      <a:endParaRPr lang="zh-CN" altLang="en-US" dirty="0"/>
+                    </a:p>
+                  </a:txBody>
+                  <a:tcPr/>
+                </a:tc>
+                <a:extLst>
+                  <a:ext uri="{0D108BD9-81ED-4DB2-BD59-A6C34878D82A}">
+                    <a16:rowId xmlns:a16="http://schemas.microsoft.com/office/drawing/2014/main" val="3678217547"/>
+                  </a:ext>
+                </a:extLst>
+              </a:tr>
+              <a:tr h="370840">
+                <a:tc>
+                  <a:txBody>
+                    <a:bodyPr/>
+                    <a:lstStyle/>
+                    <a:p>
+                      <a:r>
+                        <a:rPr lang="en-US" altLang="zh-CN" dirty="0"/>
+                        <a:t>MLR</a:t>
+                      </a:r>
+                      <a:endParaRPr lang="zh-CN" altLang="en-US" dirty="0"/>
+                    </a:p>
+                  </a:txBody>
+                  <a:tcPr/>
+                </a:tc>
+                <a:tc>
+                  <a:txBody>
+                    <a:bodyPr/>
+                    <a:lstStyle/>
+                    <a:p>
+                      <a:r>
+                        <a:rPr lang="en-US" altLang="zh-CN" dirty="0"/>
+                        <a:t>61</a:t>
+                      </a:r>
+                      <a:endParaRPr lang="zh-CN" altLang="en-US" dirty="0"/>
+                    </a:p>
+                  </a:txBody>
+                  <a:tcPr/>
+                </a:tc>
+                <a:tc>
+                  <a:txBody>
+                    <a:bodyPr/>
+                    <a:lstStyle/>
+                    <a:p>
+                      <a:r>
+                        <a:rPr lang="en-US" altLang="zh-CN" dirty="0"/>
+                        <a:t>88</a:t>
+                      </a:r>
+                      <a:endParaRPr lang="zh-CN" altLang="en-US" dirty="0"/>
+                    </a:p>
+                  </a:txBody>
+                  <a:tcPr/>
+                </a:tc>
+                <a:tc>
+                  <a:txBody>
+                    <a:bodyPr/>
+                    <a:lstStyle/>
+                    <a:p>
+                      <a:r>
+                        <a:rPr lang="en-US" altLang="zh-CN" dirty="0"/>
+                        <a:t>114</a:t>
+                      </a:r>
+                      <a:endParaRPr lang="zh-CN" altLang="en-US" dirty="0"/>
+                    </a:p>
+                  </a:txBody>
+                  <a:tcPr/>
+                </a:tc>
+                <a:tc>
+                  <a:txBody>
+                    <a:bodyPr/>
+                    <a:lstStyle/>
+                    <a:p>
+                      <a:r>
+                        <a:rPr lang="en-US" altLang="zh-CN" dirty="0"/>
+                        <a:t>140</a:t>
+                      </a:r>
+                      <a:endParaRPr lang="zh-CN" altLang="en-US" dirty="0"/>
+                    </a:p>
+                  </a:txBody>
+                  <a:tcPr/>
+                </a:tc>
+                <a:tc>
+                  <a:txBody>
+                    <a:bodyPr/>
+                    <a:lstStyle/>
+                    <a:p>
+                      <a:r>
+                        <a:rPr lang="en-US" altLang="zh-CN" dirty="0"/>
+                        <a:t>166</a:t>
+                      </a:r>
+                      <a:endParaRPr lang="zh-CN" altLang="en-US" dirty="0"/>
+                    </a:p>
+                  </a:txBody>
+                  <a:tcPr/>
+                </a:tc>
+                <a:extLst>
+                  <a:ext uri="{0D108BD9-81ED-4DB2-BD59-A6C34878D82A}">
+                    <a16:rowId xmlns:a16="http://schemas.microsoft.com/office/drawing/2014/main" val="2794013994"/>
+                  </a:ext>
+                </a:extLst>
+              </a:tr>
+            </a:tbl>
+          </a:graphicData>
+        </a:graphic>
+      </p:graphicFrame>
+      <p:graphicFrame>
+        <p:nvGraphicFramePr>
+          <p:cNvPr id="5" name="表格 4">
+            <a:extLst>
+              <a:ext uri="{FF2B5EF4-FFF2-40B4-BE49-F238E27FC236}">
+                <a16:creationId xmlns:a16="http://schemas.microsoft.com/office/drawing/2014/main" id="{36FC294D-74C9-4AB8-ADEC-B6B68A9BD532}"/>
+              </a:ext>
+            </a:extLst>
+          </p:cNvPr>
+          <p:cNvGraphicFramePr>
+            <a:graphicFrameLocks noGrp="1"/>
+          </p:cNvGraphicFramePr>
+          <p:nvPr>
+            <p:extLst>
+              <p:ext uri="{D42A27DB-BD31-4B8C-83A1-F6EECF244321}">
+                <p14:modId xmlns:p14="http://schemas.microsoft.com/office/powerpoint/2010/main" val="1239515935"/>
+              </p:ext>
+            </p:extLst>
+          </p:nvPr>
+        </p:nvGraphicFramePr>
+        <p:xfrm>
+          <a:off x="1295401" y="4643656"/>
+          <a:ext cx="8128002" cy="741680"/>
+        </p:xfrm>
+        <a:graphic>
+          <a:graphicData uri="http://schemas.openxmlformats.org/drawingml/2006/table">
+            <a:tbl>
+              <a:tblPr firstRow="1" bandRow="1">
+                <a:tableStyleId>{5C22544A-7EE6-4342-B048-85BDC9FD1C3A}</a:tableStyleId>
+              </a:tblPr>
+              <a:tblGrid>
+                <a:gridCol w="1354667">
+                  <a:extLst>
+                    <a:ext uri="{9D8B030D-6E8A-4147-A177-3AD203B41FA5}">
+                      <a16:colId xmlns:a16="http://schemas.microsoft.com/office/drawing/2014/main" val="2744293896"/>
+                    </a:ext>
+                  </a:extLst>
+                </a:gridCol>
+                <a:gridCol w="1354667">
+                  <a:extLst>
+                    <a:ext uri="{9D8B030D-6E8A-4147-A177-3AD203B41FA5}">
+                      <a16:colId xmlns:a16="http://schemas.microsoft.com/office/drawing/2014/main" val="2513380016"/>
+                    </a:ext>
+                  </a:extLst>
+                </a:gridCol>
+                <a:gridCol w="1354667">
+                  <a:extLst>
+                    <a:ext uri="{9D8B030D-6E8A-4147-A177-3AD203B41FA5}">
+                      <a16:colId xmlns:a16="http://schemas.microsoft.com/office/drawing/2014/main" val="1893152973"/>
+                    </a:ext>
+                  </a:extLst>
+                </a:gridCol>
+                <a:gridCol w="1354667">
+                  <a:extLst>
+                    <a:ext uri="{9D8B030D-6E8A-4147-A177-3AD203B41FA5}">
+                      <a16:colId xmlns:a16="http://schemas.microsoft.com/office/drawing/2014/main" val="1348897079"/>
+                    </a:ext>
+                  </a:extLst>
+                </a:gridCol>
+                <a:gridCol w="1354667">
+                  <a:extLst>
+                    <a:ext uri="{9D8B030D-6E8A-4147-A177-3AD203B41FA5}">
+                      <a16:colId xmlns:a16="http://schemas.microsoft.com/office/drawing/2014/main" val="866707286"/>
+                    </a:ext>
+                  </a:extLst>
+                </a:gridCol>
+                <a:gridCol w="1354667">
+                  <a:extLst>
+                    <a:ext uri="{9D8B030D-6E8A-4147-A177-3AD203B41FA5}">
+                      <a16:colId xmlns:a16="http://schemas.microsoft.com/office/drawing/2014/main" val="308860719"/>
+                    </a:ext>
+                  </a:extLst>
+                </a:gridCol>
+              </a:tblGrid>
+              <a:tr h="370840">
+                <a:tc>
+                  <a:txBody>
+                    <a:bodyPr/>
+                    <a:lstStyle/>
+                    <a:p>
+                      <a:r>
+                        <a:rPr lang="en-US" altLang="zh-CN" dirty="0"/>
+                        <a:t>k</a:t>
+                      </a:r>
+                      <a:endParaRPr lang="zh-CN" altLang="en-US" dirty="0"/>
+                    </a:p>
+                  </a:txBody>
+                  <a:tcPr/>
+                </a:tc>
+                <a:tc>
+                  <a:txBody>
+                    <a:bodyPr/>
+                    <a:lstStyle/>
+                    <a:p>
+                      <a:r>
+                        <a:rPr lang="en-US" altLang="zh-CN" dirty="0"/>
+                        <a:t>1</a:t>
+                      </a:r>
+                      <a:endParaRPr lang="zh-CN" altLang="en-US" dirty="0"/>
+                    </a:p>
+                  </a:txBody>
+                  <a:tcPr/>
+                </a:tc>
+                <a:tc>
+                  <a:txBody>
+                    <a:bodyPr/>
+                    <a:lstStyle/>
+                    <a:p>
+                      <a:r>
+                        <a:rPr lang="en-US" altLang="zh-CN" dirty="0"/>
+                        <a:t>2</a:t>
+                      </a:r>
+                      <a:endParaRPr lang="zh-CN" altLang="en-US" dirty="0"/>
+                    </a:p>
+                  </a:txBody>
+                  <a:tcPr/>
+                </a:tc>
+                <a:tc>
+                  <a:txBody>
+                    <a:bodyPr/>
+                    <a:lstStyle/>
+                    <a:p>
+                      <a:r>
+                        <a:rPr lang="en-US" altLang="zh-CN" dirty="0"/>
+                        <a:t>3</a:t>
+                      </a:r>
+                      <a:endParaRPr lang="zh-CN" altLang="en-US" dirty="0"/>
+                    </a:p>
+                  </a:txBody>
+                  <a:tcPr/>
+                </a:tc>
+                <a:tc>
+                  <a:txBody>
+                    <a:bodyPr/>
+                    <a:lstStyle/>
+                    <a:p>
+                      <a:r>
+                        <a:rPr lang="en-US" altLang="zh-CN" dirty="0"/>
+                        <a:t>4</a:t>
+                      </a:r>
+                      <a:endParaRPr lang="zh-CN" altLang="en-US" dirty="0"/>
+                    </a:p>
+                  </a:txBody>
+                  <a:tcPr/>
+                </a:tc>
+                <a:tc>
+                  <a:txBody>
+                    <a:bodyPr/>
+                    <a:lstStyle/>
+                    <a:p>
+                      <a:r>
+                        <a:rPr lang="en-US" altLang="zh-CN" dirty="0"/>
+                        <a:t>5</a:t>
+                      </a:r>
+                      <a:endParaRPr lang="zh-CN" altLang="en-US" dirty="0"/>
+                    </a:p>
+                  </a:txBody>
+                  <a:tcPr/>
+                </a:tc>
+                <a:extLst>
+                  <a:ext uri="{0D108BD9-81ED-4DB2-BD59-A6C34878D82A}">
+                    <a16:rowId xmlns:a16="http://schemas.microsoft.com/office/drawing/2014/main" val="2354088699"/>
+                  </a:ext>
+                </a:extLst>
+              </a:tr>
+              <a:tr h="370840">
+                <a:tc>
+                  <a:txBody>
+                    <a:bodyPr/>
+                    <a:lstStyle/>
+                    <a:p>
+                      <a:endParaRPr lang="zh-CN" altLang="en-US" dirty="0"/>
+                    </a:p>
+                  </a:txBody>
+                  <a:tcPr/>
+                </a:tc>
+                <a:tc>
+                  <a:txBody>
+                    <a:bodyPr/>
+                    <a:lstStyle/>
+                    <a:p>
+                      <a:r>
+                        <a:rPr lang="en-US" altLang="zh-CN" dirty="0"/>
+                        <a:t>72</a:t>
+                      </a:r>
+                      <a:endParaRPr lang="zh-CN" altLang="en-US" dirty="0"/>
+                    </a:p>
+                  </a:txBody>
+                  <a:tcPr/>
+                </a:tc>
+                <a:tc>
+                  <a:txBody>
+                    <a:bodyPr/>
+                    <a:lstStyle/>
+                    <a:p>
+                      <a:r>
+                        <a:rPr lang="en-US" altLang="zh-CN" dirty="0"/>
+                        <a:t>62</a:t>
+                      </a:r>
+                      <a:endParaRPr lang="zh-CN" altLang="en-US" dirty="0"/>
+                    </a:p>
+                  </a:txBody>
+                  <a:tcPr/>
+                </a:tc>
+                <a:tc>
+                  <a:txBody>
+                    <a:bodyPr/>
+                    <a:lstStyle/>
+                    <a:p>
+                      <a:r>
+                        <a:rPr lang="en-US" altLang="zh-CN" dirty="0"/>
+                        <a:t>62</a:t>
+                      </a:r>
+                      <a:endParaRPr lang="zh-CN" altLang="en-US" dirty="0"/>
+                    </a:p>
+                  </a:txBody>
+                  <a:tcPr/>
+                </a:tc>
+                <a:tc>
+                  <a:txBody>
+                    <a:bodyPr/>
+                    <a:lstStyle/>
+                    <a:p>
+                      <a:r>
+                        <a:rPr lang="en-US" altLang="zh-CN" dirty="0"/>
+                        <a:t>61</a:t>
+                      </a:r>
+                      <a:endParaRPr lang="zh-CN" altLang="en-US" dirty="0"/>
+                    </a:p>
+                  </a:txBody>
+                  <a:tcPr/>
+                </a:tc>
+                <a:tc>
+                  <a:txBody>
+                    <a:bodyPr/>
+                    <a:lstStyle/>
+                    <a:p>
+                      <a:r>
+                        <a:rPr lang="en-US" altLang="zh-CN" dirty="0"/>
+                        <a:t>61</a:t>
+                      </a:r>
+                      <a:endParaRPr lang="zh-CN" altLang="en-US" dirty="0"/>
+                    </a:p>
+                  </a:txBody>
+                  <a:tcPr/>
+                </a:tc>
+                <a:extLst>
+                  <a:ext uri="{0D108BD9-81ED-4DB2-BD59-A6C34878D82A}">
+                    <a16:rowId xmlns:a16="http://schemas.microsoft.com/office/drawing/2014/main" val="958004984"/>
+                  </a:ext>
+                </a:extLst>
+              </a:tr>
+            </a:tbl>
+          </a:graphicData>
+        </a:graphic>
+      </p:graphicFrame>
+      <p:sp>
+        <p:nvSpPr>
+          <p:cNvPr id="6" name="文本框 5">
+            <a:extLst>
+              <a:ext uri="{FF2B5EF4-FFF2-40B4-BE49-F238E27FC236}">
+                <a16:creationId xmlns:a16="http://schemas.microsoft.com/office/drawing/2014/main" id="{1EA1FAA4-44E5-4911-ACD5-45881E771595}"/>
+              </a:ext>
+            </a:extLst>
+          </p:cNvPr>
+          <p:cNvSpPr txBox="1"/>
+          <p:nvPr/>
+        </p:nvSpPr>
+        <p:spPr>
+          <a:xfrm>
+            <a:off x="1295401" y="3974841"/>
+            <a:ext cx="7904583" cy="369332"/>
+          </a:xfrm>
+          <a:prstGeom prst="rect">
+            <a:avLst/>
+          </a:prstGeom>
+          <a:noFill/>
+        </p:spPr>
+        <p:txBody>
+          <a:bodyPr wrap="square" rtlCol="0">
+            <a:spAutoFit/>
+          </a:bodyPr>
+          <a:lstStyle/>
+          <a:p>
+            <a:r>
+              <a:rPr lang="zh-CN" altLang="en-US" dirty="0"/>
+              <a:t>两种预条件子迭代步数对比</a:t>
+            </a:r>
+          </a:p>
+        </p:txBody>
+      </p:sp>
+      <p:sp>
+        <p:nvSpPr>
+          <p:cNvPr id="7" name="文本框 6">
+            <a:extLst>
+              <a:ext uri="{FF2B5EF4-FFF2-40B4-BE49-F238E27FC236}">
+                <a16:creationId xmlns:a16="http://schemas.microsoft.com/office/drawing/2014/main" id="{4A0FDFAE-7077-4FE0-8602-DE4D5AE49E32}"/>
+              </a:ext>
+            </a:extLst>
+          </p:cNvPr>
+          <p:cNvSpPr txBox="1"/>
+          <p:nvPr/>
+        </p:nvSpPr>
+        <p:spPr>
+          <a:xfrm>
+            <a:off x="1295400" y="5530815"/>
+            <a:ext cx="7904583" cy="369332"/>
+          </a:xfrm>
+          <a:prstGeom prst="rect">
+            <a:avLst/>
+          </a:prstGeom>
+          <a:noFill/>
+        </p:spPr>
+        <p:txBody>
+          <a:bodyPr wrap="square" rtlCol="0">
+            <a:spAutoFit/>
+          </a:bodyPr>
+          <a:lstStyle/>
+          <a:p>
+            <a:r>
+              <a:rPr lang="en-US" altLang="zh-CN" dirty="0"/>
+              <a:t>MLR</a:t>
+            </a:r>
+            <a:r>
+              <a:rPr lang="zh-CN" altLang="en-US" dirty="0"/>
+              <a:t>方法使用不同的</a:t>
+            </a:r>
+            <a:r>
+              <a:rPr lang="en-US" altLang="zh-CN" dirty="0"/>
+              <a:t>k</a:t>
+            </a:r>
+            <a:r>
+              <a:rPr lang="zh-CN" altLang="en-US" dirty="0"/>
+              <a:t>的迭代步数</a:t>
+            </a:r>
+          </a:p>
+        </p:txBody>
+      </p:sp>
+    </p:spTree>
+    <p:extLst>
+      <p:ext uri="{BB962C8B-B14F-4D97-AF65-F5344CB8AC3E}">
+        <p14:creationId xmlns:p14="http://schemas.microsoft.com/office/powerpoint/2010/main" val="3384684825"/>
+      </p:ext>
+    </p:extLst>
+  </p:cSld>
+  <p:clrMapOvr>
+    <a:masterClrMapping/>
+  </p:clrMapOvr>
+</p:sld>
+</file>
+
+<file path=ppt/slides/slide15.xml><?xml version="1.0" encoding="utf-8"?>
+<p:sld xmlns:a="http://schemas.openxmlformats.org/drawingml/2006/main" xmlns:r="http://schemas.openxmlformats.org/officeDocument/2006/relationships" xmlns:p="http://schemas.openxmlformats.org/presentationml/2006/main">
+  <p:cSld>
+    <p:spTree>
+      <p:nvGrpSpPr>
+        <p:cNvPr id="1" name=""/>
+        <p:cNvGrpSpPr/>
+        <p:nvPr/>
+      </p:nvGrpSpPr>
+      <p:grpSpPr>
+        <a:xfrm>
+          <a:off x="0" y="0"/>
+          <a:ext cx="0" cy="0"/>
+          <a:chOff x="0" y="0"/>
+          <a:chExt cx="0" cy="0"/>
+        </a:xfrm>
+      </p:grpSpPr>
+      <p:sp>
+        <p:nvSpPr>
+          <p:cNvPr id="2" name="Title 1">
+            <a:extLst>
+              <a:ext uri="{FF2B5EF4-FFF2-40B4-BE49-F238E27FC236}">
+                <a16:creationId xmlns:a16="http://schemas.microsoft.com/office/drawing/2014/main" id="{08FA0447-EE8A-4FD4-9B2F-50CE44D80D06}"/>
+              </a:ext>
+            </a:extLst>
+          </p:cNvPr>
+          <p:cNvSpPr>
+            <a:spLocks noGrp="1"/>
+          </p:cNvSpPr>
+          <p:nvPr>
+            <p:ph type="title"/>
+          </p:nvPr>
+        </p:nvSpPr>
+        <p:spPr/>
+        <p:txBody>
+          <a:bodyPr/>
+          <a:lstStyle/>
+          <a:p>
+            <a:pPr algn="l"/>
+            <a:r>
+              <a:rPr lang="zh-CN" altLang="en-US" dirty="0"/>
+              <a:t>后续工作</a:t>
+            </a:r>
+            <a:endParaRPr lang="en-US" dirty="0"/>
+          </a:p>
+        </p:txBody>
+      </p:sp>
+      <p:sp>
+        <p:nvSpPr>
+          <p:cNvPr id="4" name="Content Placeholder 3">
+            <a:extLst>
+              <a:ext uri="{FF2B5EF4-FFF2-40B4-BE49-F238E27FC236}">
+                <a16:creationId xmlns:a16="http://schemas.microsoft.com/office/drawing/2014/main" id="{41B29A9D-7C58-48D0-A432-C63F041C38DE}"/>
+              </a:ext>
+            </a:extLst>
+          </p:cNvPr>
+          <p:cNvSpPr>
+            <a:spLocks noGrp="1"/>
+          </p:cNvSpPr>
+          <p:nvPr>
+            <p:ph idx="1"/>
+          </p:nvPr>
+        </p:nvSpPr>
+        <p:spPr/>
+        <p:txBody>
+          <a:bodyPr>
+            <a:normAutofit/>
+          </a:bodyPr>
+          <a:lstStyle/>
+          <a:p>
+            <a:endParaRPr lang="en-US" dirty="0"/>
+          </a:p>
+          <a:p>
+            <a:endParaRPr lang="en-US" dirty="0"/>
+          </a:p>
+        </p:txBody>
+      </p:sp>
+      <p:sp>
+        <p:nvSpPr>
+          <p:cNvPr id="8" name="文本框 7">
+            <a:extLst>
+              <a:ext uri="{FF2B5EF4-FFF2-40B4-BE49-F238E27FC236}">
+                <a16:creationId xmlns:a16="http://schemas.microsoft.com/office/drawing/2014/main" id="{1E96F34C-4CE3-4E5D-A3B2-4872C660893F}"/>
+              </a:ext>
+            </a:extLst>
+          </p:cNvPr>
+          <p:cNvSpPr txBox="1"/>
+          <p:nvPr/>
+        </p:nvSpPr>
+        <p:spPr>
+          <a:xfrm>
+            <a:off x="1390261" y="2668555"/>
+            <a:ext cx="8966719" cy="923330"/>
+          </a:xfrm>
+          <a:prstGeom prst="rect">
+            <a:avLst/>
+          </a:prstGeom>
+          <a:noFill/>
+        </p:spPr>
+        <p:txBody>
+          <a:bodyPr wrap="square" rtlCol="0">
+            <a:spAutoFit/>
+          </a:bodyPr>
+          <a:lstStyle/>
+          <a:p>
+            <a:pPr marL="285750" indent="-285750">
+              <a:buFont typeface="Arial" panose="020B0604020202020204" pitchFamily="34" charset="0"/>
+              <a:buChar char="•"/>
+            </a:pPr>
+            <a:r>
+              <a:rPr lang="en-US" altLang="zh-CN" dirty="0"/>
+              <a:t>2D</a:t>
+            </a:r>
+            <a:r>
+              <a:rPr lang="zh-CN" altLang="en-US" dirty="0"/>
+              <a:t>模型问题的多级低秩修正方法</a:t>
+            </a:r>
+            <a:endParaRPr lang="en-US" altLang="zh-CN" dirty="0"/>
+          </a:p>
+          <a:p>
+            <a:pPr marL="285750" indent="-285750">
+              <a:buFont typeface="Arial" panose="020B0604020202020204" pitchFamily="34" charset="0"/>
+              <a:buChar char="•"/>
+            </a:pPr>
+            <a:r>
+              <a:rPr lang="zh-CN" altLang="en-US" dirty="0"/>
+              <a:t>针对一般矩阵的多级低秩修正方法</a:t>
+            </a:r>
+            <a:r>
+              <a:rPr lang="en-US" altLang="zh-CN" dirty="0"/>
+              <a:t>——</a:t>
+            </a:r>
+            <a:r>
+              <a:rPr lang="zh-CN" altLang="en-US" dirty="0"/>
+              <a:t>使用</a:t>
+            </a:r>
+            <a:r>
+              <a:rPr lang="en-US" altLang="zh-CN" dirty="0"/>
+              <a:t>metis</a:t>
+            </a:r>
+            <a:r>
+              <a:rPr lang="zh-CN" altLang="en-US" dirty="0"/>
+              <a:t>做图划分</a:t>
+            </a:r>
+            <a:endParaRPr lang="en-US" altLang="zh-CN" dirty="0"/>
+          </a:p>
+          <a:p>
+            <a:pPr marL="285750" indent="-285750">
+              <a:buFont typeface="Arial" panose="020B0604020202020204" pitchFamily="34" charset="0"/>
+              <a:buChar char="•"/>
+            </a:pPr>
+            <a:r>
+              <a:rPr lang="zh-CN" altLang="en-US" dirty="0"/>
+              <a:t>针对叶子节点，使用图稀疏化</a:t>
+            </a:r>
+            <a:r>
+              <a:rPr lang="en-US" altLang="zh-CN" dirty="0"/>
+              <a:t>+</a:t>
+            </a:r>
+            <a:r>
+              <a:rPr lang="zh-CN" altLang="en-US" dirty="0"/>
+              <a:t>完全分解替代不完全分解</a:t>
+            </a:r>
+          </a:p>
+        </p:txBody>
+      </p:sp>
+    </p:spTree>
+    <p:extLst>
+      <p:ext uri="{BB962C8B-B14F-4D97-AF65-F5344CB8AC3E}">
+        <p14:creationId xmlns:p14="http://schemas.microsoft.com/office/powerpoint/2010/main" val="3579464766"/>
+      </p:ext>
+    </p:extLst>
+  </p:cSld>
+  <p:clrMapOvr>
+    <a:masterClrMapping/>
+  </p:clrMapOvr>
+</p:sld>
+</file>
+
+<file path=ppt/slides/slide16.xml><?xml version="1.0" encoding="utf-8"?>
+<p:sld xmlns:a="http://schemas.openxmlformats.org/drawingml/2006/main" xmlns:r="http://schemas.openxmlformats.org/officeDocument/2006/relationships" xmlns:p="http://schemas.openxmlformats.org/presentationml/2006/main">
+  <p:cSld>
+    <p:spTree>
+      <p:nvGrpSpPr>
+        <p:cNvPr id="1" name=""/>
+        <p:cNvGrpSpPr/>
+        <p:nvPr/>
+      </p:nvGrpSpPr>
+      <p:grpSpPr>
+        <a:xfrm>
+          <a:off x="0" y="0"/>
+          <a:ext cx="0" cy="0"/>
+          <a:chOff x="0" y="0"/>
+          <a:chExt cx="0" cy="0"/>
+        </a:xfrm>
+      </p:grpSpPr>
+      <p:sp>
+        <p:nvSpPr>
+          <p:cNvPr id="2" name="Title 1">
+            <a:extLst>
+              <a:ext uri="{FF2B5EF4-FFF2-40B4-BE49-F238E27FC236}">
                 <a16:creationId xmlns:a16="http://schemas.microsoft.com/office/drawing/2014/main" id="{9BC91DBA-3A9E-4ADE-A474-9B2A853056AE}"/>
               </a:ext>
             </a:extLst>

</xml_diff>